<commit_message>
update ppt after meeting
</commit_message>
<xml_diff>
--- a/NoSQL.pptx
+++ b/NoSQL.pptx
@@ -15530,107 +15530,203 @@
           <a:lstStyle/>
           <a:p>
             <a:r>
-              <a:rPr lang="zh-TW" altLang="en-US" dirty="0"/>
+              <a:rPr lang="zh-TW" altLang="en-US" dirty="0">
+                <a:latin typeface="Times New Roman" panose="02020603050405020304" pitchFamily="18" charset="0"/>
+                <a:ea typeface="標楷體" panose="03000509000000000000" pitchFamily="65" charset="-120"/>
+                <a:cs typeface="Times New Roman" panose="02020603050405020304" pitchFamily="18" charset="0"/>
+              </a:rPr>
               <a:t>關聯式資料庫和</a:t>
             </a:r>
             <a:r>
-              <a:rPr lang="en-US" altLang="zh-TW" dirty="0"/>
+              <a:rPr lang="en-US" altLang="zh-TW" dirty="0">
+                <a:latin typeface="Times New Roman" panose="02020603050405020304" pitchFamily="18" charset="0"/>
+                <a:ea typeface="標楷體" panose="03000509000000000000" pitchFamily="65" charset="-120"/>
+                <a:cs typeface="Times New Roman" panose="02020603050405020304" pitchFamily="18" charset="0"/>
+              </a:rPr>
               <a:t>NoSQL</a:t>
             </a:r>
             <a:r>
-              <a:rPr lang="zh-TW" altLang="en-US" dirty="0"/>
+              <a:rPr lang="zh-TW" altLang="en-US" dirty="0">
+                <a:latin typeface="Times New Roman" panose="02020603050405020304" pitchFamily="18" charset="0"/>
+                <a:ea typeface="標楷體" panose="03000509000000000000" pitchFamily="65" charset="-120"/>
+                <a:cs typeface="Times New Roman" panose="02020603050405020304" pitchFamily="18" charset="0"/>
+              </a:rPr>
               <a:t>資料庫各有優缺點，彼此無法取代</a:t>
             </a:r>
             <a:r>
-              <a:rPr lang="en-US" altLang="zh-TW" dirty="0"/>
+              <a:rPr lang="en-US" altLang="zh-TW" dirty="0">
+                <a:latin typeface="Times New Roman" panose="02020603050405020304" pitchFamily="18" charset="0"/>
+                <a:ea typeface="標楷體" panose="03000509000000000000" pitchFamily="65" charset="-120"/>
+                <a:cs typeface="Times New Roman" panose="02020603050405020304" pitchFamily="18" charset="0"/>
+              </a:rPr>
               <a:t> </a:t>
             </a:r>
           </a:p>
           <a:p>
             <a:pPr lvl="1"/>
             <a:r>
-              <a:rPr lang="zh-TW" altLang="en-US" dirty="0"/>
+              <a:rPr lang="zh-TW" altLang="en-US" dirty="0">
+                <a:latin typeface="Times New Roman" panose="02020603050405020304" pitchFamily="18" charset="0"/>
+                <a:ea typeface="標楷體" panose="03000509000000000000" pitchFamily="65" charset="-120"/>
+                <a:cs typeface="Times New Roman" panose="02020603050405020304" pitchFamily="18" charset="0"/>
+              </a:rPr>
               <a:t>關聯式資料庫應用場域：電信、銀行等領域的關鍵任務，需要保 證強交易一致性</a:t>
             </a:r>
-            <a:endParaRPr lang="en-US" altLang="zh-TW" dirty="0"/>
+            <a:endParaRPr lang="en-US" altLang="zh-TW" dirty="0">
+              <a:latin typeface="Times New Roman" panose="02020603050405020304" pitchFamily="18" charset="0"/>
+              <a:ea typeface="標楷體" panose="03000509000000000000" pitchFamily="65" charset="-120"/>
+              <a:cs typeface="Times New Roman" panose="02020603050405020304" pitchFamily="18" charset="0"/>
+            </a:endParaRPr>
           </a:p>
           <a:p>
             <a:pPr lvl="1"/>
             <a:r>
-              <a:rPr lang="en-US" altLang="zh-TW" dirty="0"/>
+              <a:rPr lang="en-US" altLang="zh-TW" dirty="0">
+                <a:latin typeface="Times New Roman" panose="02020603050405020304" pitchFamily="18" charset="0"/>
+                <a:ea typeface="標楷體" panose="03000509000000000000" pitchFamily="65" charset="-120"/>
+                <a:cs typeface="Times New Roman" panose="02020603050405020304" pitchFamily="18" charset="0"/>
+              </a:rPr>
               <a:t>NoSQL</a:t>
             </a:r>
             <a:r>
-              <a:rPr lang="zh-TW" altLang="en-US" dirty="0"/>
+              <a:rPr lang="zh-TW" altLang="en-US" dirty="0">
+                <a:latin typeface="Times New Roman" panose="02020603050405020304" pitchFamily="18" charset="0"/>
+                <a:ea typeface="標楷體" panose="03000509000000000000" pitchFamily="65" charset="-120"/>
+                <a:cs typeface="Times New Roman" panose="02020603050405020304" pitchFamily="18" charset="0"/>
+              </a:rPr>
               <a:t>資料庫應用場域：互聯網企業、傳統企業的非關鍵任務 </a:t>
             </a:r>
             <a:r>
-              <a:rPr lang="en-US" altLang="zh-TW" dirty="0"/>
+              <a:rPr lang="en-US" altLang="zh-TW" dirty="0">
+                <a:latin typeface="Times New Roman" panose="02020603050405020304" pitchFamily="18" charset="0"/>
+                <a:ea typeface="標楷體" panose="03000509000000000000" pitchFamily="65" charset="-120"/>
+                <a:cs typeface="Times New Roman" panose="02020603050405020304" pitchFamily="18" charset="0"/>
+              </a:rPr>
               <a:t>( </a:t>
             </a:r>
             <a:r>
-              <a:rPr lang="zh-TW" altLang="en-US" dirty="0"/>
+              <a:rPr lang="zh-TW" altLang="en-US" dirty="0">
+                <a:latin typeface="Times New Roman" panose="02020603050405020304" pitchFamily="18" charset="0"/>
+                <a:ea typeface="標楷體" panose="03000509000000000000" pitchFamily="65" charset="-120"/>
+                <a:cs typeface="Times New Roman" panose="02020603050405020304" pitchFamily="18" charset="0"/>
+              </a:rPr>
               <a:t>例如：資料分析</a:t>
             </a:r>
             <a:r>
-              <a:rPr lang="en-US" altLang="zh-TW" dirty="0"/>
+              <a:rPr lang="en-US" altLang="zh-TW" dirty="0">
+                <a:latin typeface="Times New Roman" panose="02020603050405020304" pitchFamily="18" charset="0"/>
+                <a:ea typeface="標楷體" panose="03000509000000000000" pitchFamily="65" charset="-120"/>
+                <a:cs typeface="Times New Roman" panose="02020603050405020304" pitchFamily="18" charset="0"/>
+              </a:rPr>
               <a:t>) </a:t>
             </a:r>
           </a:p>
           <a:p>
             <a:r>
-              <a:rPr lang="zh-TW" altLang="en-US" dirty="0"/>
+              <a:rPr lang="zh-TW" altLang="en-US" dirty="0">
+                <a:latin typeface="Times New Roman" panose="02020603050405020304" pitchFamily="18" charset="0"/>
+                <a:ea typeface="標楷體" panose="03000509000000000000" pitchFamily="65" charset="-120"/>
+                <a:cs typeface="Times New Roman" panose="02020603050405020304" pitchFamily="18" charset="0"/>
+              </a:rPr>
               <a:t>採用混合架構</a:t>
             </a:r>
-            <a:endParaRPr lang="en-US" altLang="zh-TW" dirty="0"/>
+            <a:endParaRPr lang="en-US" altLang="zh-TW" dirty="0">
+              <a:latin typeface="Times New Roman" panose="02020603050405020304" pitchFamily="18" charset="0"/>
+              <a:ea typeface="標楷體" panose="03000509000000000000" pitchFamily="65" charset="-120"/>
+              <a:cs typeface="Times New Roman" panose="02020603050405020304" pitchFamily="18" charset="0"/>
+            </a:endParaRPr>
           </a:p>
           <a:p>
             <a:pPr lvl="1"/>
             <a:r>
-              <a:rPr lang="zh-TW" altLang="en-US" dirty="0"/>
+              <a:rPr lang="zh-TW" altLang="en-US" dirty="0">
+                <a:latin typeface="Times New Roman" panose="02020603050405020304" pitchFamily="18" charset="0"/>
+                <a:ea typeface="標楷體" panose="03000509000000000000" pitchFamily="65" charset="-120"/>
+                <a:cs typeface="Times New Roman" panose="02020603050405020304" pitchFamily="18" charset="0"/>
+              </a:rPr>
               <a:t>如：亞馬遜公司就使用不同類型的資料庫來支撐電子商務應用</a:t>
             </a:r>
-            <a:endParaRPr lang="en-US" altLang="zh-TW" dirty="0"/>
+            <a:endParaRPr lang="en-US" altLang="zh-TW" dirty="0">
+              <a:latin typeface="Times New Roman" panose="02020603050405020304" pitchFamily="18" charset="0"/>
+              <a:ea typeface="標楷體" panose="03000509000000000000" pitchFamily="65" charset="-120"/>
+              <a:cs typeface="Times New Roman" panose="02020603050405020304" pitchFamily="18" charset="0"/>
+            </a:endParaRPr>
           </a:p>
           <a:p>
             <a:pPr lvl="2"/>
             <a:r>
-              <a:rPr lang="zh-TW" altLang="en-US" dirty="0"/>
+              <a:rPr lang="zh-TW" altLang="en-US" dirty="0">
+                <a:latin typeface="Times New Roman" panose="02020603050405020304" pitchFamily="18" charset="0"/>
+                <a:ea typeface="標楷體" panose="03000509000000000000" pitchFamily="65" charset="-120"/>
+                <a:cs typeface="Times New Roman" panose="02020603050405020304" pitchFamily="18" charset="0"/>
+              </a:rPr>
               <a:t>對於“購物車”這種臨時性資料，採用鍵值儲存會更加有效率</a:t>
             </a:r>
-            <a:endParaRPr lang="en-US" altLang="zh-TW" dirty="0"/>
+            <a:endParaRPr lang="en-US" altLang="zh-TW" dirty="0">
+              <a:latin typeface="Times New Roman" panose="02020603050405020304" pitchFamily="18" charset="0"/>
+              <a:ea typeface="標楷體" panose="03000509000000000000" pitchFamily="65" charset="-120"/>
+              <a:cs typeface="Times New Roman" panose="02020603050405020304" pitchFamily="18" charset="0"/>
+            </a:endParaRPr>
           </a:p>
           <a:p>
             <a:pPr lvl="2"/>
             <a:r>
-              <a:rPr lang="zh-TW" altLang="en-US" dirty="0"/>
+              <a:rPr lang="zh-TW" altLang="en-US" dirty="0">
+                <a:latin typeface="Times New Roman" panose="02020603050405020304" pitchFamily="18" charset="0"/>
+                <a:ea typeface="標楷體" panose="03000509000000000000" pitchFamily="65" charset="-120"/>
+                <a:cs typeface="Times New Roman" panose="02020603050405020304" pitchFamily="18" charset="0"/>
+              </a:rPr>
               <a:t>當前的產品和訂單資訊則適合存放在關聯式資料庫</a:t>
             </a:r>
             <a:r>
-              <a:rPr lang="en-US" altLang="zh-TW" dirty="0"/>
+              <a:rPr lang="en-US" altLang="zh-TW" dirty="0">
+                <a:latin typeface="Times New Roman" panose="02020603050405020304" pitchFamily="18" charset="0"/>
+                <a:ea typeface="標楷體" panose="03000509000000000000" pitchFamily="65" charset="-120"/>
+                <a:cs typeface="Times New Roman" panose="02020603050405020304" pitchFamily="18" charset="0"/>
+              </a:rPr>
               <a:t>(</a:t>
             </a:r>
             <a:r>
-              <a:rPr lang="zh-TW" altLang="en-US" dirty="0"/>
+              <a:rPr lang="zh-TW" altLang="en-US" dirty="0">
+                <a:latin typeface="Times New Roman" panose="02020603050405020304" pitchFamily="18" charset="0"/>
+                <a:ea typeface="標楷體" panose="03000509000000000000" pitchFamily="65" charset="-120"/>
+                <a:cs typeface="Times New Roman" panose="02020603050405020304" pitchFamily="18" charset="0"/>
+              </a:rPr>
               <a:t>屬關鍵任務</a:t>
             </a:r>
             <a:r>
-              <a:rPr lang="en-US" altLang="zh-TW" dirty="0"/>
+              <a:rPr lang="en-US" altLang="zh-TW" dirty="0">
+                <a:latin typeface="Times New Roman" panose="02020603050405020304" pitchFamily="18" charset="0"/>
+                <a:ea typeface="標楷體" panose="03000509000000000000" pitchFamily="65" charset="-120"/>
+                <a:cs typeface="Times New Roman" panose="02020603050405020304" pitchFamily="18" charset="0"/>
+              </a:rPr>
               <a:t>)</a:t>
             </a:r>
           </a:p>
           <a:p>
             <a:pPr lvl="2"/>
             <a:r>
-              <a:rPr lang="zh-TW" altLang="en-US" dirty="0"/>
+              <a:rPr lang="zh-TW" altLang="en-US" dirty="0">
+                <a:latin typeface="Times New Roman" panose="02020603050405020304" pitchFamily="18" charset="0"/>
+                <a:ea typeface="標楷體" panose="03000509000000000000" pitchFamily="65" charset="-120"/>
+                <a:cs typeface="Times New Roman" panose="02020603050405020304" pitchFamily="18" charset="0"/>
+              </a:rPr>
               <a:t>大量的歷史訂單資訊則適合保存在類似</a:t>
             </a:r>
             <a:r>
-              <a:rPr lang="en-US" altLang="zh-TW" dirty="0"/>
+              <a:rPr lang="en-US" altLang="zh-TW" dirty="0">
+                <a:latin typeface="Times New Roman" panose="02020603050405020304" pitchFamily="18" charset="0"/>
+                <a:ea typeface="標楷體" panose="03000509000000000000" pitchFamily="65" charset="-120"/>
+                <a:cs typeface="Times New Roman" panose="02020603050405020304" pitchFamily="18" charset="0"/>
+              </a:rPr>
               <a:t>MongoDB</a:t>
             </a:r>
             <a:r>
-              <a:rPr lang="zh-TW" altLang="en-US" dirty="0"/>
+              <a:rPr lang="zh-TW" altLang="en-US" dirty="0">
+                <a:latin typeface="Times New Roman" panose="02020603050405020304" pitchFamily="18" charset="0"/>
+                <a:ea typeface="標楷體" panose="03000509000000000000" pitchFamily="65" charset="-120"/>
+                <a:cs typeface="Times New Roman" panose="02020603050405020304" pitchFamily="18" charset="0"/>
+              </a:rPr>
               <a:t>的文件資料庫中</a:t>
             </a:r>
           </a:p>
@@ -16695,14 +16791,24 @@
           <a:lstStyle/>
           <a:p>
             <a:r>
+              <a:rPr lang="zh-TW" altLang="en-US" dirty="0">
+                <a:latin typeface="Times New Roman" panose="02020603050405020304" pitchFamily="18" charset="0"/>
+                <a:ea typeface="標楷體" panose="03000509000000000000" pitchFamily="65" charset="-120"/>
+                <a:cs typeface="Times New Roman" panose="02020603050405020304" pitchFamily="18" charset="0"/>
+              </a:rPr>
+              <a:t>關聯式資料庫</a:t>
+            </a:r>
+            <a:r>
               <a:rPr lang="en-US" altLang="zh-TW" dirty="0">
                 <a:latin typeface="Times New Roman" panose="02020603050405020304" pitchFamily="18" charset="0"/>
+                <a:ea typeface="標楷體" panose="03000509000000000000" pitchFamily="65" charset="-120"/>
                 <a:cs typeface="Times New Roman" panose="02020603050405020304" pitchFamily="18" charset="0"/>
               </a:rPr>
               <a:t>ACID</a:t>
             </a:r>
             <a:endParaRPr lang="zh-TW" altLang="en-US" dirty="0">
               <a:latin typeface="Times New Roman" panose="02020603050405020304" pitchFamily="18" charset="0"/>
+              <a:ea typeface="標楷體" panose="03000509000000000000" pitchFamily="65" charset="-120"/>
               <a:cs typeface="Times New Roman" panose="02020603050405020304" pitchFamily="18" charset="0"/>
             </a:endParaRPr>
           </a:p>
@@ -17205,7 +17311,7 @@
             <p:ph idx="1"/>
             <p:extLst>
               <p:ext uri="{D42A27DB-BD31-4B8C-83A1-F6EECF244321}">
-                <p14:modId xmlns:p14="http://schemas.microsoft.com/office/powerpoint/2010/main" val="262841502"/>
+                <p14:modId xmlns:p14="http://schemas.microsoft.com/office/powerpoint/2010/main" val="2689739202"/>
               </p:ext>
             </p:extLst>
           </p:nvPr>
@@ -17819,7 +17925,7 @@
                           <a:ea typeface="標楷體" panose="03000509000000000000" pitchFamily="65" charset="-120"/>
                           <a:cs typeface="Times New Roman" panose="02020603050405020304" pitchFamily="18" charset="0"/>
                         </a:rPr>
-                        <a:t>來加速查詢，但 是，在複雜查詢方面的性能仍然不如</a:t>
+                        <a:t>來加速查詢，但是，在複雜查詢方面的性能仍然不如</a:t>
                       </a:r>
                       <a:r>
                         <a:rPr lang="en-US" altLang="zh-TW" dirty="0">
@@ -17906,7 +18012,7 @@
           <p:nvPr>
             <p:extLst>
               <p:ext uri="{D42A27DB-BD31-4B8C-83A1-F6EECF244321}">
-                <p14:modId xmlns:p14="http://schemas.microsoft.com/office/powerpoint/2010/main" val="3110780164"/>
+                <p14:modId xmlns:p14="http://schemas.microsoft.com/office/powerpoint/2010/main" val="994285705"/>
               </p:ext>
             </p:extLst>
           </p:nvPr>
@@ -18289,7 +18395,7 @@
                           <a:ea typeface="標楷體" panose="03000509000000000000" pitchFamily="65" charset="-120"/>
                           <a:cs typeface="Times New Roman" panose="02020603050405020304" pitchFamily="18" charset="0"/>
                         </a:rPr>
-                        <a:t>都可以很容易實現完整性限制，比如透過主 鍵或者非空限制來實現個體完整性，透過主鍵、外來鍵來實現 參考完整性，透過限制或者觸發器來實現用戶自訂完整性</a:t>
+                        <a:t>都可以很容易實現完整性限制，比如透過主 鍵或者非空限制來實現個體完整性，透過主鍵、外來鍵來實現參考完整性</a:t>
                       </a:r>
                       <a:endParaRPr lang="en-US" altLang="zh-TW" dirty="0">
                         <a:latin typeface="Times New Roman" panose="02020603050405020304" pitchFamily="18" charset="0"/>
@@ -18438,7 +18544,7 @@
                           <a:ea typeface="標楷體" panose="03000509000000000000" pitchFamily="65" charset="-120"/>
                           <a:cs typeface="Times New Roman" panose="02020603050405020304" pitchFamily="18" charset="0"/>
                         </a:rPr>
-                        <a:t>在設計之初就充分考慮了橫向擴展的需求，可以很容 易透過添加廉價設備實現擴展</a:t>
+                        <a:t>在設計之初就充分考慮了橫向擴展的需求，可以很容易透過添加廉價設備實現擴展</a:t>
                       </a:r>
                     </a:p>
                   </a:txBody>

</xml_diff>